<commit_message>
Getting slides used at the conference
</commit_message>
<xml_diff>
--- a/Bartek Bielawski/DscOctopus/DSC and Octopus.pptx
+++ b/Bartek Bielawski/DscOctopus/DSC and Octopus.pptx
@@ -6,10 +6,10 @@
     <p:sldMasterId id="2147483809" r:id="rId2"/>
   </p:sldMasterIdLst>
   <p:notesMasterIdLst>
-    <p:notesMasterId r:id="rId17"/>
+    <p:notesMasterId r:id="rId14"/>
   </p:notesMasterIdLst>
   <p:handoutMasterIdLst>
-    <p:handoutMasterId r:id="rId18"/>
+    <p:handoutMasterId r:id="rId15"/>
   </p:handoutMasterIdLst>
   <p:sldIdLst>
     <p:sldId id="309" r:id="rId3"/>
@@ -17,15 +17,12 @@
     <p:sldId id="317" r:id="rId5"/>
     <p:sldId id="305" r:id="rId6"/>
     <p:sldId id="315" r:id="rId7"/>
-    <p:sldId id="320" r:id="rId8"/>
-    <p:sldId id="322" r:id="rId9"/>
-    <p:sldId id="321" r:id="rId10"/>
-    <p:sldId id="316" r:id="rId11"/>
-    <p:sldId id="319" r:id="rId12"/>
-    <p:sldId id="302" r:id="rId13"/>
-    <p:sldId id="314" r:id="rId14"/>
-    <p:sldId id="312" r:id="rId15"/>
-    <p:sldId id="313" r:id="rId16"/>
+    <p:sldId id="316" r:id="rId8"/>
+    <p:sldId id="319" r:id="rId9"/>
+    <p:sldId id="302" r:id="rId10"/>
+    <p:sldId id="314" r:id="rId11"/>
+    <p:sldId id="312" r:id="rId12"/>
+    <p:sldId id="313" r:id="rId13"/>
   </p:sldIdLst>
   <p:sldSz cx="9144000" cy="6858000" type="screen4x3"/>
   <p:notesSz cx="7099300" cy="10234613"/>
@@ -4245,379 +4242,6 @@
       </p:grpSpPr>
       <p:sp>
         <p:nvSpPr>
-          <p:cNvPr id="2" name="Content Placeholder 1"/>
-          <p:cNvSpPr>
-            <a:spLocks noGrp="1"/>
-          </p:cNvSpPr>
-          <p:nvPr>
-            <p:ph idx="1"/>
-          </p:nvPr>
-        </p:nvSpPr>
-        <p:spPr/>
-        <p:txBody>
-          <a:bodyPr/>
-          <a:lstStyle/>
-          <a:p>
-            <a:r>
-              <a:rPr lang="en-US" dirty="0"/>
-              <a:t>Source control: Code review process</a:t>
-            </a:r>
-          </a:p>
-          <a:p>
-            <a:r>
-              <a:rPr lang="en-US" dirty="0"/>
-              <a:t>Bamboo: Build, test and publish code</a:t>
-            </a:r>
-          </a:p>
-          <a:p>
-            <a:r>
-              <a:rPr lang="en-US" dirty="0"/>
-              <a:t>Repository: Private PowerShell Gallery</a:t>
-            </a:r>
-          </a:p>
-          <a:p>
-            <a:r>
-              <a:rPr lang="en-US" dirty="0"/>
-              <a:t>DSC</a:t>
-            </a:r>
-            <a:r>
-              <a:rPr lang="pl-PL"/>
-              <a:t>:</a:t>
-            </a:r>
-            <a:r>
-              <a:rPr lang="en-US"/>
-              <a:t> </a:t>
-            </a:r>
-            <a:r>
-              <a:rPr lang="en-US" dirty="0"/>
-              <a:t>Partial Configurations</a:t>
-            </a:r>
-          </a:p>
-        </p:txBody>
-      </p:sp>
-      <p:sp>
-        <p:nvSpPr>
-          <p:cNvPr id="3" name="Title 2"/>
-          <p:cNvSpPr>
-            <a:spLocks noGrp="1"/>
-          </p:cNvSpPr>
-          <p:nvPr>
-            <p:ph type="title"/>
-          </p:nvPr>
-        </p:nvSpPr>
-        <p:spPr/>
-        <p:txBody>
-          <a:bodyPr/>
-          <a:lstStyle/>
-          <a:p>
-            <a:r>
-              <a:rPr lang="en-US" dirty="0"/>
-              <a:t>Demo</a:t>
-            </a:r>
-            <a:endParaRPr lang="nl-NL" dirty="0"/>
-          </a:p>
-        </p:txBody>
-      </p:sp>
-    </p:spTree>
-    <p:extLst>
-      <p:ext uri="{BB962C8B-B14F-4D97-AF65-F5344CB8AC3E}">
-        <p14:creationId xmlns:p14="http://schemas.microsoft.com/office/powerpoint/2010/main" val="1022385736"/>
-      </p:ext>
-    </p:extLst>
-  </p:cSld>
-  <p:clrMapOvr>
-    <a:masterClrMapping/>
-  </p:clrMapOvr>
-  <mc:AlternateContent xmlns:mc="http://schemas.openxmlformats.org/markup-compatibility/2006" xmlns:p14="http://schemas.microsoft.com/office/powerpoint/2010/main">
-    <mc:Choice Requires="p14">
-      <p:transition spd="slow" p14:dur="1300">
-        <p14:pan dir="u"/>
-      </p:transition>
-    </mc:Choice>
-    <mc:Fallback xmlns="">
-      <p:transition spd="slow">
-        <p:fade/>
-      </p:transition>
-    </mc:Fallback>
-  </mc:AlternateContent>
-</p:sld>
-</file>
-
-<file path=ppt/slides/slide11.xml><?xml version="1.0" encoding="utf-8"?>
-<p:sld xmlns:a="http://schemas.openxmlformats.org/drawingml/2006/main" xmlns:r="http://schemas.openxmlformats.org/officeDocument/2006/relationships" xmlns:p="http://schemas.openxmlformats.org/presentationml/2006/main">
-  <p:cSld>
-    <p:spTree>
-      <p:nvGrpSpPr>
-        <p:cNvPr id="1" name=""/>
-        <p:cNvGrpSpPr/>
-        <p:nvPr/>
-      </p:nvGrpSpPr>
-      <p:grpSpPr>
-        <a:xfrm>
-          <a:off x="0" y="0"/>
-          <a:ext cx="0" cy="0"/>
-          <a:chOff x="0" y="0"/>
-          <a:chExt cx="0" cy="0"/>
-        </a:xfrm>
-      </p:grpSpPr>
-      <p:sp>
-        <p:nvSpPr>
-          <p:cNvPr id="2" name="Titel 1"/>
-          <p:cNvSpPr>
-            <a:spLocks noGrp="1"/>
-          </p:cNvSpPr>
-          <p:nvPr>
-            <p:ph type="title"/>
-          </p:nvPr>
-        </p:nvSpPr>
-        <p:spPr>
-          <a:xfrm>
-            <a:off x="0" y="908720"/>
-            <a:ext cx="9144000" cy="792088"/>
-          </a:xfrm>
-          <a:prstGeom prst="rect">
-            <a:avLst/>
-          </a:prstGeom>
-        </p:spPr>
-        <p:txBody>
-          <a:bodyPr/>
-          <a:lstStyle/>
-          <a:p>
-            <a:r>
-              <a:rPr lang="en-US" noProof="0" dirty="0"/>
-              <a:t>Summary</a:t>
-            </a:r>
-          </a:p>
-        </p:txBody>
-      </p:sp>
-      <p:sp>
-        <p:nvSpPr>
-          <p:cNvPr id="3" name="Inhaltsplatzhalter 2"/>
-          <p:cNvSpPr>
-            <a:spLocks noGrp="1"/>
-          </p:cNvSpPr>
-          <p:nvPr>
-            <p:ph idx="1"/>
-          </p:nvPr>
-        </p:nvSpPr>
-        <p:spPr/>
-        <p:txBody>
-          <a:bodyPr/>
-          <a:lstStyle/>
-          <a:p>
-            <a:r>
-              <a:rPr lang="pl-PL" dirty="0" err="1"/>
-              <a:t>Code</a:t>
-            </a:r>
-            <a:r>
-              <a:rPr lang="pl-PL" dirty="0"/>
-              <a:t> </a:t>
-            </a:r>
-            <a:r>
-              <a:rPr lang="pl-PL" dirty="0" err="1"/>
-              <a:t>revisioned</a:t>
-            </a:r>
-            <a:r>
-              <a:rPr lang="pl-PL" dirty="0"/>
-              <a:t>, </a:t>
-            </a:r>
-            <a:r>
-              <a:rPr lang="pl-PL" dirty="0" err="1"/>
-              <a:t>tested</a:t>
-            </a:r>
-            <a:r>
-              <a:rPr lang="pl-PL" dirty="0"/>
-              <a:t>, </a:t>
-            </a:r>
-            <a:r>
-              <a:rPr lang="pl-PL" dirty="0" err="1"/>
-              <a:t>distributed</a:t>
-            </a:r>
-            <a:endParaRPr lang="pl-PL" dirty="0"/>
-          </a:p>
-          <a:p>
-            <a:r>
-              <a:rPr lang="pl-PL" dirty="0"/>
-              <a:t>DSC for </a:t>
-            </a:r>
-            <a:r>
-              <a:rPr lang="pl-PL" dirty="0" err="1"/>
-              <a:t>keeping</a:t>
-            </a:r>
-            <a:r>
-              <a:rPr lang="pl-PL" dirty="0"/>
-              <a:t> </a:t>
-            </a:r>
-            <a:r>
-              <a:rPr lang="pl-PL" dirty="0" err="1"/>
-              <a:t>state</a:t>
-            </a:r>
-            <a:r>
-              <a:rPr lang="pl-PL" dirty="0"/>
-              <a:t>, </a:t>
-            </a:r>
-            <a:r>
-              <a:rPr lang="pl-PL" dirty="0" err="1"/>
-              <a:t>Octopus</a:t>
-            </a:r>
-            <a:r>
-              <a:rPr lang="pl-PL" dirty="0"/>
-              <a:t> to </a:t>
-            </a:r>
-            <a:r>
-              <a:rPr lang="pl-PL" dirty="0" err="1"/>
-              <a:t>change</a:t>
-            </a:r>
-            <a:r>
-              <a:rPr lang="pl-PL" dirty="0"/>
-              <a:t> </a:t>
-            </a:r>
-            <a:r>
-              <a:rPr lang="pl-PL" dirty="0" err="1"/>
-              <a:t>it</a:t>
-            </a:r>
-            <a:endParaRPr lang="pl-PL" noProof="0" dirty="0"/>
-          </a:p>
-          <a:p>
-            <a:r>
-              <a:rPr lang="pl-PL" noProof="0" dirty="0"/>
-              <a:t>Application </a:t>
-            </a:r>
-            <a:r>
-              <a:rPr lang="pl-PL" noProof="0" dirty="0" err="1"/>
-              <a:t>lifecycle</a:t>
-            </a:r>
-            <a:r>
-              <a:rPr lang="pl-PL" dirty="0"/>
-              <a:t> requires </a:t>
-            </a:r>
-            <a:r>
-              <a:rPr lang="pl-PL" dirty="0" err="1"/>
-              <a:t>control</a:t>
-            </a:r>
-            <a:endParaRPr lang="en-US" noProof="0" dirty="0"/>
-          </a:p>
-        </p:txBody>
-      </p:sp>
-    </p:spTree>
-    <p:extLst>
-      <p:ext uri="{BB962C8B-B14F-4D97-AF65-F5344CB8AC3E}">
-        <p14:creationId xmlns:p14="http://schemas.microsoft.com/office/powerpoint/2010/main" val="3109724331"/>
-      </p:ext>
-    </p:extLst>
-  </p:cSld>
-  <p:clrMapOvr>
-    <a:masterClrMapping/>
-  </p:clrMapOvr>
-  <mc:AlternateContent xmlns:mc="http://schemas.openxmlformats.org/markup-compatibility/2006" xmlns:p14="http://schemas.microsoft.com/office/powerpoint/2010/main">
-    <mc:Choice Requires="p14">
-      <p:transition p14:dur="0"/>
-    </mc:Choice>
-    <mc:Fallback xmlns="">
-      <p:transition/>
-    </mc:Fallback>
-  </mc:AlternateContent>
-</p:sld>
-</file>
-
-<file path=ppt/slides/slide12.xml><?xml version="1.0" encoding="utf-8"?>
-<p:sld xmlns:a="http://schemas.openxmlformats.org/drawingml/2006/main" xmlns:r="http://schemas.openxmlformats.org/officeDocument/2006/relationships" xmlns:p="http://schemas.openxmlformats.org/presentationml/2006/main">
-  <p:cSld>
-    <p:spTree>
-      <p:nvGrpSpPr>
-        <p:cNvPr id="1" name=""/>
-        <p:cNvGrpSpPr/>
-        <p:nvPr/>
-      </p:nvGrpSpPr>
-      <p:grpSpPr>
-        <a:xfrm>
-          <a:off x="0" y="0"/>
-          <a:ext cx="0" cy="0"/>
-          <a:chOff x="0" y="0"/>
-          <a:chExt cx="0" cy="0"/>
-        </a:xfrm>
-      </p:grpSpPr>
-      <p:sp>
-        <p:nvSpPr>
-          <p:cNvPr id="2" name="Titel 1"/>
-          <p:cNvSpPr>
-            <a:spLocks noGrp="1"/>
-          </p:cNvSpPr>
-          <p:nvPr>
-            <p:ph type="title"/>
-          </p:nvPr>
-        </p:nvSpPr>
-        <p:spPr/>
-        <p:txBody>
-          <a:bodyPr/>
-          <a:lstStyle/>
-          <a:p>
-            <a:r>
-              <a:rPr lang="en-US" noProof="0" dirty="0"/>
-              <a:t>Questions?</a:t>
-            </a:r>
-          </a:p>
-        </p:txBody>
-      </p:sp>
-      <p:sp>
-        <p:nvSpPr>
-          <p:cNvPr id="3" name="Textplatzhalter 2"/>
-          <p:cNvSpPr>
-            <a:spLocks noGrp="1"/>
-          </p:cNvSpPr>
-          <p:nvPr>
-            <p:ph type="body" idx="1"/>
-          </p:nvPr>
-        </p:nvSpPr>
-        <p:spPr/>
-        <p:txBody>
-          <a:bodyPr/>
-          <a:lstStyle/>
-          <a:p>
-            <a:endParaRPr lang="de-DE" dirty="0"/>
-          </a:p>
-        </p:txBody>
-      </p:sp>
-    </p:spTree>
-    <p:extLst>
-      <p:ext uri="{BB962C8B-B14F-4D97-AF65-F5344CB8AC3E}">
-        <p14:creationId xmlns:p14="http://schemas.microsoft.com/office/powerpoint/2010/main" val="4184402693"/>
-      </p:ext>
-    </p:extLst>
-  </p:cSld>
-  <p:clrMapOvr>
-    <a:masterClrMapping/>
-  </p:clrMapOvr>
-  <mc:AlternateContent xmlns:mc="http://schemas.openxmlformats.org/markup-compatibility/2006" xmlns:p14="http://schemas.microsoft.com/office/powerpoint/2010/main">
-    <mc:Choice Requires="p14">
-      <p:transition p14:dur="0"/>
-    </mc:Choice>
-    <mc:Fallback xmlns="">
-      <p:transition/>
-    </mc:Fallback>
-  </mc:AlternateContent>
-</p:sld>
-</file>
-
-<file path=ppt/slides/slide13.xml><?xml version="1.0" encoding="utf-8"?>
-<p:sld xmlns:a="http://schemas.openxmlformats.org/drawingml/2006/main" xmlns:r="http://schemas.openxmlformats.org/officeDocument/2006/relationships" xmlns:p="http://schemas.openxmlformats.org/presentationml/2006/main">
-  <p:cSld>
-    <p:spTree>
-      <p:nvGrpSpPr>
-        <p:cNvPr id="1" name=""/>
-        <p:cNvGrpSpPr/>
-        <p:nvPr/>
-      </p:nvGrpSpPr>
-      <p:grpSpPr>
-        <a:xfrm>
-          <a:off x="0" y="0"/>
-          <a:ext cx="0" cy="0"/>
-          <a:chOff x="0" y="0"/>
-          <a:chExt cx="0" cy="0"/>
-        </a:xfrm>
-      </p:grpSpPr>
-      <p:sp>
-        <p:nvSpPr>
           <p:cNvPr id="2" name="Inhaltsplatzhalter 1"/>
           <p:cNvSpPr>
             <a:spLocks noGrp="1"/>
@@ -4747,7 +4371,7 @@
 </p:sld>
 </file>
 
-<file path=ppt/slides/slide14.xml><?xml version="1.0" encoding="utf-8"?>
+<file path=ppt/slides/slide11.xml><?xml version="1.0" encoding="utf-8"?>
 <p:sld xmlns:a="http://schemas.openxmlformats.org/drawingml/2006/main" xmlns:r="http://schemas.openxmlformats.org/officeDocument/2006/relationships" xmlns:p="http://schemas.openxmlformats.org/presentationml/2006/main">
   <p:cSld>
     <p:spTree>
@@ -5410,7 +5034,11 @@
             </a:r>
             <a:r>
               <a:rPr lang="pl-PL" dirty="0"/>
-              <a:t>…</a:t>
+              <a:t> and </a:t>
+            </a:r>
+            <a:r>
+              <a:rPr lang="pl-PL" dirty="0" err="1"/>
+              <a:t>solutions</a:t>
             </a:r>
             <a:endParaRPr lang="en-US" noProof="0" dirty="0"/>
           </a:p>
@@ -5431,10 +5059,47 @@
           <a:bodyPr/>
           <a:lstStyle/>
           <a:p>
+            <a:r>
+              <a:rPr lang="pl-PL" dirty="0" err="1"/>
+              <a:t>Problems</a:t>
+            </a:r>
+            <a:r>
+              <a:rPr lang="pl-PL" dirty="0"/>
+              <a:t>:</a:t>
+            </a:r>
+          </a:p>
+          <a:p>
             <a:pPr lvl="1"/>
             <a:r>
               <a:rPr lang="pl-PL" dirty="0"/>
-              <a:t>No </a:t>
+              <a:t>Manual chaos</a:t>
+            </a:r>
+          </a:p>
+          <a:p>
+            <a:pPr lvl="1"/>
+            <a:r>
+              <a:rPr lang="pl-PL" dirty="0"/>
+              <a:t>Configuration </a:t>
+            </a:r>
+            <a:r>
+              <a:rPr lang="pl-PL" dirty="0" err="1"/>
+              <a:t>is</a:t>
+            </a:r>
+            <a:r>
+              <a:rPr lang="pl-PL" dirty="0"/>
+              <a:t> </a:t>
+            </a:r>
+            <a:r>
+              <a:rPr lang="pl-PL" dirty="0" err="1"/>
+              <a:t>unknown</a:t>
+            </a:r>
+            <a:endParaRPr lang="pl-PL" dirty="0"/>
+          </a:p>
+          <a:p>
+            <a:pPr lvl="1"/>
+            <a:r>
+              <a:rPr lang="pl-PL" dirty="0"/>
+              <a:t>Lack of </a:t>
             </a:r>
             <a:r>
               <a:rPr lang="pl-PL" dirty="0" err="1"/>
@@ -5442,11 +5107,33 @@
             </a:r>
             <a:r>
               <a:rPr lang="pl-PL" dirty="0"/>
-              <a:t> </a:t>
+              <a:t> and </a:t>
             </a:r>
             <a:r>
               <a:rPr lang="pl-PL" dirty="0" err="1"/>
-              <a:t>over</a:t>
+              <a:t>consistency</a:t>
+            </a:r>
+            <a:endParaRPr lang="pl-PL" dirty="0"/>
+          </a:p>
+          <a:p>
+            <a:pPr lvl="1"/>
+            <a:endParaRPr lang="pl-PL" dirty="0"/>
+          </a:p>
+          <a:p>
+            <a:r>
+              <a:rPr lang="pl-PL" dirty="0"/>
+              <a:t>Solutions:</a:t>
+            </a:r>
+          </a:p>
+          <a:p>
+            <a:pPr lvl="1"/>
+            <a:r>
+              <a:rPr lang="pl-PL" dirty="0"/>
+              <a:t>PowerShell DSC </a:t>
+            </a:r>
+            <a:r>
+              <a:rPr lang="pl-PL" dirty="0" err="1"/>
+              <a:t>is</a:t>
             </a:r>
             <a:r>
               <a:rPr lang="pl-PL" dirty="0"/>
@@ -5454,219 +5141,38 @@
             </a:r>
             <a:r>
               <a:rPr lang="pl-PL" dirty="0" err="1"/>
-              <a:t>code</a:t>
+              <a:t>great</a:t>
             </a:r>
             <a:r>
               <a:rPr lang="pl-PL" dirty="0"/>
-              <a:t> running in </a:t>
-            </a:r>
+              <a:t>! But…</a:t>
+            </a:r>
+          </a:p>
+          <a:p>
+            <a:pPr lvl="1"/>
             <a:r>
               <a:rPr lang="pl-PL" dirty="0" err="1"/>
-              <a:t>production</a:t>
-            </a:r>
-            <a:endParaRPr lang="en-US" dirty="0"/>
-          </a:p>
-          <a:p>
-            <a:pPr lvl="2"/>
+              <a:t>Octopus</a:t>
+            </a:r>
             <a:r>
               <a:rPr lang="pl-PL" dirty="0"/>
-              <a:t>No </a:t>
+              <a:t>: do one </a:t>
             </a:r>
             <a:r>
               <a:rPr lang="pl-PL" dirty="0" err="1"/>
-              <a:t>peer</a:t>
+              <a:t>thing</a:t>
             </a:r>
             <a:r>
               <a:rPr lang="pl-PL" dirty="0"/>
-              <a:t> </a:t>
+              <a:t>, </a:t>
             </a:r>
             <a:r>
               <a:rPr lang="pl-PL" dirty="0" err="1"/>
-              <a:t>review</a:t>
-            </a:r>
-            <a:r>
-              <a:rPr lang="pl-PL" dirty="0"/>
-              <a:t>/ </a:t>
-            </a:r>
-            <a:r>
-              <a:rPr lang="pl-PL" dirty="0" err="1"/>
-              <a:t>agreed</a:t>
-            </a:r>
-            <a:r>
-              <a:rPr lang="pl-PL" dirty="0"/>
-              <a:t> </a:t>
-            </a:r>
-            <a:r>
-              <a:rPr lang="pl-PL" dirty="0" err="1"/>
-              <a:t>standards</a:t>
+              <a:t>right</a:t>
             </a:r>
             <a:endParaRPr lang="pl-PL" dirty="0"/>
           </a:p>
           <a:p>
-            <a:pPr lvl="2"/>
-            <a:r>
-              <a:rPr lang="pl-PL" dirty="0"/>
-              <a:t>Running scripts </a:t>
-            </a:r>
-            <a:r>
-              <a:rPr lang="pl-PL" dirty="0" err="1"/>
-              <a:t>without</a:t>
-            </a:r>
-            <a:r>
-              <a:rPr lang="pl-PL" dirty="0"/>
-              <a:t> </a:t>
-            </a:r>
-            <a:r>
-              <a:rPr lang="pl-PL" dirty="0" err="1"/>
-              <a:t>testing</a:t>
-            </a:r>
-            <a:r>
-              <a:rPr lang="pl-PL" dirty="0"/>
-              <a:t> the </a:t>
-            </a:r>
-            <a:r>
-              <a:rPr lang="pl-PL" dirty="0" err="1"/>
-              <a:t>code</a:t>
-            </a:r>
-            <a:endParaRPr lang="pl-PL" dirty="0"/>
-          </a:p>
-          <a:p>
-            <a:pPr lvl="2"/>
-            <a:r>
-              <a:rPr lang="pl-PL" dirty="0"/>
-              <a:t>No </a:t>
-            </a:r>
-            <a:r>
-              <a:rPr lang="pl-PL" dirty="0" err="1"/>
-              <a:t>easy</a:t>
-            </a:r>
-            <a:r>
-              <a:rPr lang="pl-PL" dirty="0"/>
-              <a:t> </a:t>
-            </a:r>
-            <a:r>
-              <a:rPr lang="pl-PL" dirty="0" err="1"/>
-              <a:t>way</a:t>
-            </a:r>
-            <a:r>
-              <a:rPr lang="pl-PL" dirty="0"/>
-              <a:t> to </a:t>
-            </a:r>
-            <a:r>
-              <a:rPr lang="pl-PL" dirty="0" err="1"/>
-              <a:t>share</a:t>
-            </a:r>
-            <a:r>
-              <a:rPr lang="pl-PL" dirty="0"/>
-              <a:t> </a:t>
-            </a:r>
-            <a:r>
-              <a:rPr lang="pl-PL" dirty="0" err="1"/>
-              <a:t>artifacts</a:t>
-            </a:r>
-            <a:endParaRPr lang="pl-PL" dirty="0"/>
-          </a:p>
-          <a:p>
-            <a:pPr lvl="1"/>
-            <a:r>
-              <a:rPr lang="pl-PL" dirty="0"/>
-              <a:t>„</a:t>
-            </a:r>
-            <a:r>
-              <a:rPr lang="pl-PL" dirty="0" err="1"/>
-              <a:t>Snowflake</a:t>
-            </a:r>
-            <a:r>
-              <a:rPr lang="pl-PL" dirty="0"/>
-              <a:t>” </a:t>
-            </a:r>
-            <a:r>
-              <a:rPr lang="pl-PL" dirty="0" err="1"/>
-              <a:t>servers</a:t>
-            </a:r>
-            <a:r>
-              <a:rPr lang="pl-PL" dirty="0"/>
-              <a:t> not </a:t>
-            </a:r>
-            <a:r>
-              <a:rPr lang="pl-PL" dirty="0" err="1"/>
-              <a:t>easy</a:t>
-            </a:r>
-            <a:r>
-              <a:rPr lang="pl-PL" dirty="0"/>
-              <a:t> to </a:t>
-            </a:r>
-            <a:r>
-              <a:rPr lang="pl-PL" dirty="0" err="1"/>
-              <a:t>scale</a:t>
-            </a:r>
-            <a:r>
-              <a:rPr lang="pl-PL" dirty="0"/>
-              <a:t>/replace</a:t>
-            </a:r>
-            <a:endParaRPr lang="en-US" dirty="0"/>
-          </a:p>
-          <a:p>
-            <a:pPr lvl="1"/>
-            <a:r>
-              <a:rPr lang="en-US" dirty="0"/>
-              <a:t>Configuration is unknown</a:t>
-            </a:r>
-          </a:p>
-          <a:p>
-            <a:pPr lvl="1"/>
-            <a:r>
-              <a:rPr lang="en-US" dirty="0"/>
-              <a:t>Lack of control and consistency</a:t>
-            </a:r>
-            <a:endParaRPr lang="pl-PL" dirty="0"/>
-          </a:p>
-          <a:p>
-            <a:pPr lvl="1"/>
-            <a:r>
-              <a:rPr lang="pl-PL" dirty="0"/>
-              <a:t>Manual </a:t>
-            </a:r>
-            <a:r>
-              <a:rPr lang="pl-PL" dirty="0" err="1"/>
-              <a:t>steps</a:t>
-            </a:r>
-            <a:r>
-              <a:rPr lang="pl-PL" dirty="0"/>
-              <a:t> in Windows Server </a:t>
-            </a:r>
-            <a:r>
-              <a:rPr lang="pl-PL" dirty="0" err="1"/>
-              <a:t>deployment</a:t>
-            </a:r>
-            <a:endParaRPr lang="pl-PL" dirty="0"/>
-          </a:p>
-          <a:p>
-            <a:pPr lvl="1"/>
-            <a:r>
-              <a:rPr lang="en-US" dirty="0"/>
-              <a:t>Manual chaos</a:t>
-            </a:r>
-            <a:r>
-              <a:rPr lang="pl-PL" dirty="0"/>
-              <a:t> in </a:t>
-            </a:r>
-            <a:r>
-              <a:rPr lang="pl-PL" dirty="0" err="1"/>
-              <a:t>application</a:t>
-            </a:r>
-            <a:r>
-              <a:rPr lang="pl-PL" dirty="0"/>
-              <a:t> </a:t>
-            </a:r>
-            <a:r>
-              <a:rPr lang="pl-PL" dirty="0" err="1"/>
-              <a:t>deployment</a:t>
-            </a:r>
-            <a:endParaRPr lang="pl-PL" dirty="0"/>
-          </a:p>
-          <a:p>
-            <a:pPr lvl="1"/>
             <a:endParaRPr lang="pl-PL" dirty="0"/>
           </a:p>
         </p:txBody>
@@ -5724,83 +5230,16 @@
           <a:bodyPr/>
           <a:lstStyle/>
           <a:p>
-            <a:pPr lvl="1"/>
-            <a:r>
-              <a:rPr lang="pl-PL" dirty="0"/>
-              <a:t>Source </a:t>
-            </a:r>
-            <a:r>
-              <a:rPr lang="pl-PL" dirty="0" err="1"/>
-              <a:t>control</a:t>
-            </a:r>
-            <a:endParaRPr lang="pl-PL" dirty="0"/>
-          </a:p>
-          <a:p>
-            <a:pPr lvl="1"/>
-            <a:r>
-              <a:rPr lang="pl-PL" dirty="0"/>
-              <a:t>CI </a:t>
-            </a:r>
-            <a:r>
-              <a:rPr lang="pl-PL" dirty="0" err="1"/>
-              <a:t>pipeline</a:t>
-            </a:r>
-            <a:r>
-              <a:rPr lang="pl-PL" dirty="0"/>
-              <a:t> for </a:t>
-            </a:r>
-            <a:r>
-              <a:rPr lang="pl-PL" dirty="0" err="1"/>
-              <a:t>code</a:t>
-            </a:r>
-            <a:r>
-              <a:rPr lang="pl-PL" dirty="0"/>
-              <a:t> </a:t>
-            </a:r>
-            <a:r>
-              <a:rPr lang="pl-PL" dirty="0" err="1"/>
-              <a:t>used</a:t>
-            </a:r>
-            <a:r>
-              <a:rPr lang="pl-PL" dirty="0"/>
-              <a:t> in </a:t>
-            </a:r>
-            <a:r>
-              <a:rPr lang="pl-PL" dirty="0" err="1"/>
-              <a:t>production</a:t>
-            </a:r>
-            <a:endParaRPr lang="pl-PL" dirty="0"/>
-          </a:p>
-          <a:p>
-            <a:pPr lvl="1"/>
-            <a:r>
-              <a:rPr lang="pl-PL" dirty="0"/>
-              <a:t>Configuration management</a:t>
-            </a:r>
-          </a:p>
-          <a:p>
-            <a:pPr lvl="1"/>
-            <a:r>
-              <a:rPr lang="pl-PL" dirty="0" err="1"/>
-              <a:t>Automated</a:t>
-            </a:r>
-            <a:r>
-              <a:rPr lang="pl-PL" dirty="0"/>
-              <a:t> </a:t>
-            </a:r>
-            <a:r>
-              <a:rPr lang="pl-PL" dirty="0" err="1"/>
-              <a:t>application</a:t>
-            </a:r>
-            <a:r>
-              <a:rPr lang="pl-PL" dirty="0"/>
-              <a:t> </a:t>
-            </a:r>
-            <a:r>
-              <a:rPr lang="pl-PL" dirty="0" err="1"/>
-              <a:t>deployment</a:t>
-            </a:r>
-            <a:endParaRPr lang="pl-PL" dirty="0"/>
+            <a:pPr marL="0" indent="0">
+              <a:buNone/>
+            </a:pPr>
+            <a:endParaRPr lang="en-US" dirty="0"/>
+          </a:p>
+          <a:p>
+            <a:pPr marL="0" indent="0">
+              <a:buNone/>
+            </a:pPr>
+            <a:endParaRPr lang="en-US" dirty="0"/>
           </a:p>
         </p:txBody>
       </p:sp>
@@ -5825,20 +5264,40 @@
             </a:r>
             <a:r>
               <a:rPr lang="pl-PL" dirty="0" err="1"/>
-              <a:t>solutions</a:t>
-            </a:r>
-            <a:r>
-              <a:rPr lang="pl-PL" dirty="0"/>
-              <a:t>…</a:t>
+              <a:t>architecture</a:t>
             </a:r>
             <a:endParaRPr lang="en-US" dirty="0"/>
           </a:p>
         </p:txBody>
       </p:sp>
+      <p:pic>
+        <p:nvPicPr>
+          <p:cNvPr id="12" name="Picture 11"/>
+          <p:cNvPicPr>
+            <a:picLocks noChangeAspect="1"/>
+          </p:cNvPicPr>
+          <p:nvPr/>
+        </p:nvPicPr>
+        <p:blipFill>
+          <a:blip r:embed="rId2"/>
+          <a:stretch>
+            <a:fillRect/>
+          </a:stretch>
+        </p:blipFill>
+        <p:spPr>
+          <a:xfrm>
+            <a:off x="1125279" y="1326082"/>
+            <a:ext cx="7049337" cy="5432375"/>
+          </a:xfrm>
+          <a:prstGeom prst="rect">
+            <a:avLst/>
+          </a:prstGeom>
+        </p:spPr>
+      </p:pic>
     </p:spTree>
     <p:extLst>
       <p:ext uri="{BB962C8B-B14F-4D97-AF65-F5344CB8AC3E}">
-        <p14:creationId xmlns:p14="http://schemas.microsoft.com/office/powerpoint/2010/main" val="2306937082"/>
+        <p14:creationId xmlns:p14="http://schemas.microsoft.com/office/powerpoint/2010/main" val="1146952830"/>
       </p:ext>
     </p:extLst>
   </p:cSld>
@@ -5847,14 +5306,10 @@
   </p:clrMapOvr>
   <mc:AlternateContent xmlns:mc="http://schemas.openxmlformats.org/markup-compatibility/2006" xmlns:p14="http://schemas.microsoft.com/office/powerpoint/2010/main">
     <mc:Choice Requires="p14">
-      <p:transition spd="slow" p14:dur="1300">
-        <p14:pan dir="u"/>
-      </p:transition>
+      <p:transition p14:dur="0"/>
     </mc:Choice>
     <mc:Fallback xmlns="">
-      <p:transition spd="slow">
-        <p:fade/>
-      </p:transition>
+      <p:transition/>
     </mc:Fallback>
   </mc:AlternateContent>
 </p:sld>
@@ -5893,133 +5348,85 @@
           <a:lstStyle/>
           <a:p>
             <a:r>
+              <a:rPr lang="en-US" dirty="0"/>
+              <a:t>Source control: Code review process</a:t>
+            </a:r>
+          </a:p>
+          <a:p>
+            <a:r>
+              <a:rPr lang="en-US" dirty="0"/>
+              <a:t>Bamboo: Build, test and publish code</a:t>
+            </a:r>
+          </a:p>
+          <a:p>
+            <a:r>
+              <a:rPr lang="en-US" dirty="0"/>
+              <a:t>Repository: Private PowerShell Gallery</a:t>
+            </a:r>
+          </a:p>
+          <a:p>
+            <a:r>
+              <a:rPr lang="en-US" dirty="0"/>
+              <a:t>DSC</a:t>
+            </a:r>
+            <a:r>
+              <a:rPr lang="pl-PL" dirty="0"/>
+              <a:t>:</a:t>
+            </a:r>
+            <a:r>
+              <a:rPr lang="en-US" dirty="0"/>
+              <a:t> Partial Configurations</a:t>
+            </a:r>
+            <a:endParaRPr lang="pl-PL" dirty="0"/>
+          </a:p>
+          <a:p>
+            <a:r>
               <a:rPr lang="pl-PL" dirty="0" err="1"/>
-              <a:t>BitBucket</a:t>
+              <a:t>Octopus</a:t>
+            </a:r>
+            <a:r>
+              <a:rPr lang="pl-PL" dirty="0"/>
+              <a:t>:</a:t>
+            </a:r>
+          </a:p>
+          <a:p>
+            <a:pPr lvl="1"/>
+            <a:r>
+              <a:rPr lang="pl-PL" dirty="0"/>
+              <a:t>Control LCM</a:t>
+            </a:r>
+          </a:p>
+          <a:p>
+            <a:pPr lvl="1"/>
+            <a:r>
+              <a:rPr lang="pl-PL" dirty="0" err="1"/>
+              <a:t>Deploy</a:t>
             </a:r>
             <a:endParaRPr lang="pl-PL" dirty="0"/>
           </a:p>
           <a:p>
             <a:pPr lvl="1"/>
             <a:r>
+              <a:rPr lang="pl-PL" dirty="0" err="1"/>
+              <a:t>Rollback</a:t>
+            </a:r>
+            <a:endParaRPr lang="pl-PL" dirty="0"/>
+          </a:p>
+          <a:p>
+            <a:pPr lvl="1"/>
+            <a:r>
+              <a:rPr lang="pl-PL" dirty="0" err="1"/>
+              <a:t>Use</a:t>
+            </a:r>
+            <a:r>
               <a:rPr lang="pl-PL" dirty="0"/>
-              <a:t>Target for </a:t>
+              <a:t> of Invoke-</a:t>
             </a:r>
             <a:r>
               <a:rPr lang="pl-PL" dirty="0" err="1"/>
-              <a:t>all</a:t>
-            </a:r>
-            <a:r>
-              <a:rPr lang="pl-PL" dirty="0"/>
-              <a:t> </a:t>
-            </a:r>
-            <a:r>
-              <a:rPr lang="pl-PL" dirty="0" err="1"/>
-              <a:t>code</a:t>
-            </a:r>
-            <a:r>
-              <a:rPr lang="pl-PL" dirty="0"/>
-              <a:t> in Optiver</a:t>
-            </a:r>
-          </a:p>
-          <a:p>
-            <a:pPr lvl="1"/>
-            <a:r>
-              <a:rPr lang="pl-PL" dirty="0"/>
-              <a:t>Was </a:t>
-            </a:r>
-            <a:r>
-              <a:rPr lang="pl-PL" dirty="0" err="1"/>
-              <a:t>already</a:t>
-            </a:r>
-            <a:r>
-              <a:rPr lang="pl-PL" dirty="0"/>
-              <a:t> </a:t>
-            </a:r>
-            <a:r>
-              <a:rPr lang="pl-PL" dirty="0" err="1"/>
-              <a:t>there</a:t>
-            </a:r>
-            <a:endParaRPr lang="pl-PL" dirty="0"/>
-          </a:p>
-          <a:p>
-            <a:r>
-              <a:rPr lang="pl-PL" dirty="0" err="1"/>
-              <a:t>Bamboo</a:t>
-            </a:r>
-            <a:endParaRPr lang="pl-PL" dirty="0"/>
-          </a:p>
-          <a:p>
-            <a:pPr lvl="1"/>
-            <a:r>
-              <a:rPr lang="pl-PL" dirty="0"/>
-              <a:t>Integration with </a:t>
-            </a:r>
-            <a:r>
-              <a:rPr lang="pl-PL" dirty="0" err="1"/>
-              <a:t>BitBucket</a:t>
-            </a:r>
-            <a:endParaRPr lang="pl-PL" dirty="0"/>
-          </a:p>
-          <a:p>
-            <a:pPr lvl="1"/>
-            <a:r>
-              <a:rPr lang="pl-PL" dirty="0"/>
-              <a:t>Support for PowerShell</a:t>
-            </a:r>
-          </a:p>
-          <a:p>
-            <a:r>
-              <a:rPr lang="pl-PL" dirty="0" err="1"/>
-              <a:t>Artifactory</a:t>
-            </a:r>
-            <a:endParaRPr lang="pl-PL" dirty="0"/>
-          </a:p>
-          <a:p>
-            <a:pPr lvl="1"/>
-            <a:r>
-              <a:rPr lang="pl-PL" dirty="0"/>
-              <a:t>Target for </a:t>
-            </a:r>
-            <a:r>
-              <a:rPr lang="pl-PL" dirty="0" err="1"/>
-              <a:t>all</a:t>
-            </a:r>
-            <a:r>
-              <a:rPr lang="pl-PL" dirty="0"/>
-              <a:t> </a:t>
-            </a:r>
-            <a:r>
-              <a:rPr lang="pl-PL" dirty="0" err="1"/>
-              <a:t>artifacts</a:t>
-            </a:r>
-            <a:r>
-              <a:rPr lang="pl-PL" dirty="0"/>
-              <a:t> in Optiver</a:t>
-            </a:r>
-          </a:p>
-          <a:p>
-            <a:pPr lvl="1"/>
-            <a:r>
-              <a:rPr lang="pl-PL" dirty="0" err="1"/>
-              <a:t>Supports</a:t>
-            </a:r>
-            <a:r>
-              <a:rPr lang="pl-PL" dirty="0"/>
-              <a:t> </a:t>
-            </a:r>
-            <a:r>
-              <a:rPr lang="pl-PL" dirty="0" err="1"/>
-              <a:t>NuGet</a:t>
-            </a:r>
-            <a:r>
-              <a:rPr lang="pl-PL" dirty="0"/>
-              <a:t> </a:t>
-            </a:r>
-            <a:r>
-              <a:rPr lang="pl-PL" dirty="0" err="1"/>
-              <a:t>packages</a:t>
-            </a:r>
-            <a:endParaRPr lang="pl-PL" dirty="0"/>
+              <a:t>DSCResource</a:t>
+            </a:r>
+            <a:endParaRPr lang="en-US" dirty="0"/>
           </a:p>
         </p:txBody>
       </p:sp>
@@ -6039,25 +5446,17 @@
           <a:lstStyle/>
           <a:p>
             <a:r>
-              <a:rPr lang="pl-PL" dirty="0"/>
-              <a:t>How: </a:t>
-            </a:r>
-            <a:r>
-              <a:rPr lang="pl-PL" dirty="0" err="1"/>
-              <a:t>tooling</a:t>
-            </a:r>
-            <a:r>
-              <a:rPr lang="pl-PL" dirty="0"/>
-              <a:t>… (1)</a:t>
-            </a:r>
-            <a:endParaRPr lang="en-US" dirty="0"/>
+              <a:rPr lang="en-US" dirty="0"/>
+              <a:t>Demo</a:t>
+            </a:r>
+            <a:endParaRPr lang="nl-NL" dirty="0"/>
           </a:p>
         </p:txBody>
       </p:sp>
     </p:spTree>
     <p:extLst>
       <p:ext uri="{BB962C8B-B14F-4D97-AF65-F5344CB8AC3E}">
-        <p14:creationId xmlns:p14="http://schemas.microsoft.com/office/powerpoint/2010/main" val="971983683"/>
+        <p14:creationId xmlns:p14="http://schemas.microsoft.com/office/powerpoint/2010/main" val="1022385736"/>
       </p:ext>
     </p:extLst>
   </p:cSld>
@@ -6098,7 +5497,37 @@
       </p:grpSpPr>
       <p:sp>
         <p:nvSpPr>
-          <p:cNvPr id="2" name="Content Placeholder 1"/>
+          <p:cNvPr id="2" name="Titel 1"/>
+          <p:cNvSpPr>
+            <a:spLocks noGrp="1"/>
+          </p:cNvSpPr>
+          <p:nvPr>
+            <p:ph type="title"/>
+          </p:nvPr>
+        </p:nvSpPr>
+        <p:spPr>
+          <a:xfrm>
+            <a:off x="0" y="908720"/>
+            <a:ext cx="9144000" cy="792088"/>
+          </a:xfrm>
+          <a:prstGeom prst="rect">
+            <a:avLst/>
+          </a:prstGeom>
+        </p:spPr>
+        <p:txBody>
+          <a:bodyPr/>
+          <a:lstStyle/>
+          <a:p>
+            <a:r>
+              <a:rPr lang="en-US" noProof="0" dirty="0"/>
+              <a:t>Summary</a:t>
+            </a:r>
+          </a:p>
+        </p:txBody>
+      </p:sp>
+      <p:sp>
+        <p:nvSpPr>
+          <p:cNvPr id="3" name="Inhaltsplatzhalter 2"/>
           <p:cNvSpPr>
             <a:spLocks noGrp="1"/>
           </p:cNvSpPr>
@@ -6112,15 +5541,8 @@
           <a:lstStyle/>
           <a:p>
             <a:r>
-              <a:rPr lang="pl-PL" dirty="0"/>
-              <a:t>DSC – configuration management</a:t>
-            </a:r>
-          </a:p>
-          <a:p>
-            <a:pPr lvl="1"/>
-            <a:r>
               <a:rPr lang="pl-PL" dirty="0" err="1"/>
-              <a:t>Build</a:t>
+              <a:t>Code</a:t>
             </a:r>
             <a:r>
               <a:rPr lang="pl-PL" dirty="0"/>
@@ -6128,18 +5550,34 @@
             </a:r>
             <a:r>
               <a:rPr lang="pl-PL" dirty="0" err="1"/>
-              <a:t>into</a:t>
+              <a:t>revisioned</a:t>
             </a:r>
             <a:r>
               <a:rPr lang="pl-PL" dirty="0"/>
-              <a:t> Windows</a:t>
-            </a:r>
-          </a:p>
-          <a:p>
-            <a:pPr lvl="1"/>
+              <a:t>, </a:t>
+            </a:r>
             <a:r>
               <a:rPr lang="pl-PL" dirty="0" err="1"/>
-              <a:t>Continiously</a:t>
+              <a:t>tested</a:t>
+            </a:r>
+            <a:r>
+              <a:rPr lang="pl-PL" dirty="0"/>
+              <a:t>, </a:t>
+            </a:r>
+            <a:r>
+              <a:rPr lang="pl-PL" dirty="0" err="1"/>
+              <a:t>distributed</a:t>
+            </a:r>
+            <a:endParaRPr lang="pl-PL" dirty="0"/>
+          </a:p>
+          <a:p>
+            <a:r>
+              <a:rPr lang="pl-PL" dirty="0"/>
+              <a:t>DSC for </a:t>
+            </a:r>
+            <a:r>
+              <a:rPr lang="pl-PL" dirty="0" err="1"/>
+              <a:t>keeping</a:t>
             </a:r>
             <a:r>
               <a:rPr lang="pl-PL" dirty="0"/>
@@ -6147,27 +5585,23 @@
             </a:r>
             <a:r>
               <a:rPr lang="pl-PL" dirty="0" err="1"/>
-              <a:t>extended</a:t>
+              <a:t>state</a:t>
             </a:r>
             <a:r>
               <a:rPr lang="pl-PL" dirty="0"/>
-              <a:t> by Microsoft and </a:t>
+              <a:t>, </a:t>
             </a:r>
             <a:r>
               <a:rPr lang="pl-PL" dirty="0" err="1"/>
-              <a:t>Community</a:t>
-            </a:r>
-            <a:endParaRPr lang="pl-PL" dirty="0"/>
-          </a:p>
-          <a:p>
-            <a:pPr lvl="1"/>
+              <a:t>Octopus</a:t>
+            </a:r>
             <a:r>
               <a:rPr lang="pl-PL" dirty="0"/>
-              <a:t>We </a:t>
+              <a:t> to </a:t>
             </a:r>
             <a:r>
               <a:rPr lang="pl-PL" dirty="0" err="1"/>
-              <a:t>can</a:t>
+              <a:t>change</a:t>
             </a:r>
             <a:r>
               <a:rPr lang="pl-PL" dirty="0"/>
@@ -6175,182 +5609,35 @@
             </a:r>
             <a:r>
               <a:rPr lang="pl-PL" dirty="0" err="1"/>
-              <a:t>extend</a:t>
+              <a:t>it</a:t>
+            </a:r>
+            <a:endParaRPr lang="pl-PL" noProof="0" dirty="0"/>
+          </a:p>
+          <a:p>
+            <a:r>
+              <a:rPr lang="pl-PL" noProof="0" dirty="0"/>
+              <a:t>Application </a:t>
+            </a:r>
+            <a:r>
+              <a:rPr lang="pl-PL" noProof="0" dirty="0" err="1"/>
+              <a:t>lifecycle</a:t>
             </a:r>
             <a:r>
               <a:rPr lang="pl-PL" dirty="0"/>
-              <a:t> </a:t>
+              <a:t> requires </a:t>
             </a:r>
             <a:r>
               <a:rPr lang="pl-PL" dirty="0" err="1"/>
-              <a:t>it</a:t>
-            </a:r>
-            <a:r>
-              <a:rPr lang="pl-PL" dirty="0"/>
-              <a:t> </a:t>
-            </a:r>
-            <a:r>
-              <a:rPr lang="pl-PL" dirty="0" err="1"/>
-              <a:t>ourselves</a:t>
-            </a:r>
-            <a:endParaRPr lang="pl-PL" dirty="0"/>
-          </a:p>
-          <a:p>
-            <a:r>
-              <a:rPr lang="pl-PL" dirty="0" err="1"/>
-              <a:t>Octopus</a:t>
-            </a:r>
-            <a:r>
-              <a:rPr lang="pl-PL" dirty="0"/>
-              <a:t> – </a:t>
-            </a:r>
-            <a:r>
-              <a:rPr lang="pl-PL" dirty="0" err="1"/>
-              <a:t>automated</a:t>
-            </a:r>
-            <a:r>
-              <a:rPr lang="pl-PL" dirty="0"/>
-              <a:t> </a:t>
-            </a:r>
-            <a:r>
-              <a:rPr lang="pl-PL" dirty="0" err="1"/>
-              <a:t>application</a:t>
-            </a:r>
-            <a:r>
-              <a:rPr lang="pl-PL" dirty="0"/>
-              <a:t> </a:t>
-            </a:r>
-            <a:r>
-              <a:rPr lang="pl-PL" dirty="0" err="1"/>
-              <a:t>deployment</a:t>
-            </a:r>
-            <a:endParaRPr lang="pl-PL" dirty="0"/>
-          </a:p>
-          <a:p>
-            <a:pPr lvl="1"/>
-            <a:r>
-              <a:rPr lang="pl-PL" dirty="0" err="1"/>
-              <a:t>Designed</a:t>
-            </a:r>
-            <a:r>
-              <a:rPr lang="pl-PL" dirty="0"/>
-              <a:t> to </a:t>
-            </a:r>
-            <a:r>
-              <a:rPr lang="pl-PL" dirty="0" err="1"/>
-              <a:t>deploy</a:t>
-            </a:r>
-            <a:r>
-              <a:rPr lang="pl-PL" dirty="0"/>
-              <a:t> .NET </a:t>
-            </a:r>
-            <a:r>
-              <a:rPr lang="pl-PL" dirty="0" err="1"/>
-              <a:t>applications</a:t>
-            </a:r>
-            <a:endParaRPr lang="pl-PL" dirty="0"/>
-          </a:p>
-          <a:p>
-            <a:pPr lvl="1"/>
-            <a:r>
-              <a:rPr lang="pl-PL" dirty="0" err="1"/>
-              <a:t>Industry</a:t>
-            </a:r>
-            <a:r>
-              <a:rPr lang="pl-PL" dirty="0"/>
-              <a:t> standard for Windows </a:t>
-            </a:r>
-            <a:r>
-              <a:rPr lang="pl-PL" dirty="0" err="1"/>
-              <a:t>deployments</a:t>
-            </a:r>
-            <a:endParaRPr lang="pl-PL" dirty="0"/>
-          </a:p>
-          <a:p>
-            <a:pPr lvl="1"/>
-            <a:r>
-              <a:rPr lang="pl-PL" dirty="0"/>
-              <a:t>API </a:t>
-            </a:r>
-            <a:r>
-              <a:rPr lang="pl-PL" dirty="0" err="1"/>
-              <a:t>driven</a:t>
-            </a:r>
-            <a:endParaRPr lang="pl-PL" dirty="0"/>
-          </a:p>
-          <a:p>
-            <a:pPr lvl="1"/>
-            <a:r>
-              <a:rPr lang="pl-PL" dirty="0" err="1"/>
-              <a:t>Easy</a:t>
-            </a:r>
-            <a:r>
-              <a:rPr lang="pl-PL" dirty="0"/>
-              <a:t> to set </a:t>
-            </a:r>
-            <a:r>
-              <a:rPr lang="pl-PL" dirty="0" err="1"/>
-              <a:t>up</a:t>
-            </a:r>
-            <a:r>
-              <a:rPr lang="pl-PL" dirty="0"/>
-              <a:t> and </a:t>
-            </a:r>
-            <a:r>
-              <a:rPr lang="pl-PL" dirty="0" err="1"/>
-              <a:t>user</a:t>
-            </a:r>
-            <a:r>
-              <a:rPr lang="pl-PL" dirty="0"/>
-              <a:t> </a:t>
-            </a:r>
-            <a:r>
-              <a:rPr lang="pl-PL" dirty="0" err="1"/>
-              <a:t>friendly</a:t>
-            </a:r>
-            <a:endParaRPr lang="pl-PL" dirty="0"/>
-          </a:p>
-          <a:p>
-            <a:pPr lvl="1"/>
-            <a:endParaRPr lang="en-US" dirty="0"/>
-          </a:p>
-        </p:txBody>
-      </p:sp>
-      <p:sp>
-        <p:nvSpPr>
-          <p:cNvPr id="3" name="Title 2"/>
-          <p:cNvSpPr>
-            <a:spLocks noGrp="1"/>
-          </p:cNvSpPr>
-          <p:nvPr>
-            <p:ph type="title"/>
-          </p:nvPr>
-        </p:nvSpPr>
-        <p:spPr/>
-        <p:txBody>
-          <a:bodyPr/>
-          <a:lstStyle/>
-          <a:p>
-            <a:r>
-              <a:rPr lang="pl-PL" dirty="0"/>
-              <a:t>How: </a:t>
-            </a:r>
-            <a:r>
-              <a:rPr lang="pl-PL" dirty="0" err="1"/>
-              <a:t>tooling</a:t>
-            </a:r>
-            <a:r>
-              <a:rPr lang="pl-PL" dirty="0"/>
-              <a:t>… (2)</a:t>
-            </a:r>
-            <a:endParaRPr lang="en-US" dirty="0"/>
+              <a:t>control</a:t>
+            </a:r>
+            <a:endParaRPr lang="en-US" noProof="0" dirty="0"/>
           </a:p>
         </p:txBody>
       </p:sp>
     </p:spTree>
     <p:extLst>
       <p:ext uri="{BB962C8B-B14F-4D97-AF65-F5344CB8AC3E}">
-        <p14:creationId xmlns:p14="http://schemas.microsoft.com/office/powerpoint/2010/main" val="2401900543"/>
+        <p14:creationId xmlns:p14="http://schemas.microsoft.com/office/powerpoint/2010/main" val="3109724331"/>
       </p:ext>
     </p:extLst>
   </p:cSld>
@@ -6359,14 +5646,10 @@
   </p:clrMapOvr>
   <mc:AlternateContent xmlns:mc="http://schemas.openxmlformats.org/markup-compatibility/2006" xmlns:p14="http://schemas.microsoft.com/office/powerpoint/2010/main">
     <mc:Choice Requires="p14">
-      <p:transition spd="slow" p14:dur="1300">
-        <p14:pan dir="u"/>
-      </p:transition>
+      <p:transition p14:dur="0"/>
     </mc:Choice>
     <mc:Fallback xmlns="">
-      <p:transition spd="slow">
-        <p:fade/>
-      </p:transition>
+      <p:transition/>
     </mc:Fallback>
   </mc:AlternateContent>
 </p:sld>
@@ -6391,35 +5674,7 @@
       </p:grpSpPr>
       <p:sp>
         <p:nvSpPr>
-          <p:cNvPr id="2" name="Content Placeholder 1"/>
-          <p:cNvSpPr>
-            <a:spLocks noGrp="1"/>
-          </p:cNvSpPr>
-          <p:nvPr>
-            <p:ph idx="1"/>
-          </p:nvPr>
-        </p:nvSpPr>
-        <p:spPr/>
-        <p:txBody>
-          <a:bodyPr/>
-          <a:lstStyle/>
-          <a:p>
-            <a:pPr marL="0" indent="0">
-              <a:buNone/>
-            </a:pPr>
-            <a:endParaRPr lang="en-US" dirty="0"/>
-          </a:p>
-          <a:p>
-            <a:pPr marL="0" indent="0">
-              <a:buNone/>
-            </a:pPr>
-            <a:endParaRPr lang="en-US" dirty="0"/>
-          </a:p>
-        </p:txBody>
-      </p:sp>
-      <p:sp>
-        <p:nvSpPr>
-          <p:cNvPr id="3" name="Title 2"/>
+          <p:cNvPr id="2" name="Titel 1"/>
           <p:cNvSpPr>
             <a:spLocks noGrp="1"/>
           </p:cNvSpPr>
@@ -6433,45 +5688,35 @@
           <a:lstStyle/>
           <a:p>
             <a:r>
-              <a:rPr lang="pl-PL" dirty="0"/>
-              <a:t>How: </a:t>
-            </a:r>
-            <a:r>
-              <a:rPr lang="pl-PL" dirty="0" err="1"/>
-              <a:t>architecture</a:t>
-            </a:r>
-            <a:endParaRPr lang="en-US" dirty="0"/>
+              <a:rPr lang="en-US" noProof="0" dirty="0"/>
+              <a:t>Questions?</a:t>
+            </a:r>
           </a:p>
         </p:txBody>
       </p:sp>
-      <p:pic>
-        <p:nvPicPr>
-          <p:cNvPr id="12" name="Picture 11"/>
-          <p:cNvPicPr>
-            <a:picLocks noChangeAspect="1"/>
-          </p:cNvPicPr>
-          <p:nvPr/>
-        </p:nvPicPr>
-        <p:blipFill>
-          <a:blip r:embed="rId2"/>
-          <a:stretch>
-            <a:fillRect/>
-          </a:stretch>
-        </p:blipFill>
-        <p:spPr>
-          <a:xfrm>
-            <a:off x="1125279" y="1326082"/>
-            <a:ext cx="7049337" cy="5432375"/>
-          </a:xfrm>
-          <a:prstGeom prst="rect">
-            <a:avLst/>
-          </a:prstGeom>
-        </p:spPr>
-      </p:pic>
+      <p:sp>
+        <p:nvSpPr>
+          <p:cNvPr id="3" name="Textplatzhalter 2"/>
+          <p:cNvSpPr>
+            <a:spLocks noGrp="1"/>
+          </p:cNvSpPr>
+          <p:nvPr>
+            <p:ph type="body" idx="1"/>
+          </p:nvPr>
+        </p:nvSpPr>
+        <p:spPr/>
+        <p:txBody>
+          <a:bodyPr/>
+          <a:lstStyle/>
+          <a:p>
+            <a:endParaRPr lang="de-DE" dirty="0"/>
+          </a:p>
+        </p:txBody>
+      </p:sp>
     </p:spTree>
     <p:extLst>
       <p:ext uri="{BB962C8B-B14F-4D97-AF65-F5344CB8AC3E}">
-        <p14:creationId xmlns:p14="http://schemas.microsoft.com/office/powerpoint/2010/main" val="1146952830"/>
+        <p14:creationId xmlns:p14="http://schemas.microsoft.com/office/powerpoint/2010/main" val="4184402693"/>
       </p:ext>
     </p:extLst>
   </p:cSld>

</xml_diff>

<commit_message>
Last update to the slides
</commit_message>
<xml_diff>
--- a/Bartek Bielawski/DscOctopus/DSC and Octopus.pptx
+++ b/Bartek Bielawski/DscOctopus/DSC and Octopus.pptx
@@ -5145,7 +5145,7 @@
             </a:r>
             <a:r>
               <a:rPr lang="pl-PL" dirty="0"/>
-              <a:t>! But…</a:t>
+              <a:t>! But...</a:t>
             </a:r>
           </a:p>
           <a:p>
@@ -5629,6 +5629,41 @@
             <a:r>
               <a:rPr lang="pl-PL" dirty="0" err="1"/>
               <a:t>control</a:t>
+            </a:r>
+            <a:endParaRPr lang="pl-PL" dirty="0"/>
+          </a:p>
+          <a:p>
+            <a:r>
+              <a:rPr lang="pl-PL" noProof="0" dirty="0" err="1"/>
+              <a:t>Look</a:t>
+            </a:r>
+            <a:r>
+              <a:rPr lang="pl-PL" noProof="0" dirty="0"/>
+              <a:t> </a:t>
+            </a:r>
+            <a:r>
+              <a:rPr lang="pl-PL" noProof="0" dirty="0" err="1"/>
+              <a:t>around</a:t>
+            </a:r>
+            <a:r>
+              <a:rPr lang="pl-PL" noProof="0" dirty="0"/>
+              <a:t>, </a:t>
+            </a:r>
+            <a:r>
+              <a:rPr lang="pl-PL" noProof="0" dirty="0" err="1"/>
+              <a:t>ask</a:t>
+            </a:r>
+            <a:r>
+              <a:rPr lang="pl-PL" noProof="0" dirty="0"/>
+              <a:t>, </a:t>
+            </a:r>
+            <a:r>
+              <a:rPr lang="pl-PL" noProof="0" dirty="0" err="1"/>
+              <a:t>reuse</a:t>
+            </a:r>
+            <a:r>
+              <a:rPr lang="pl-PL" noProof="0" dirty="0"/>
+              <a:t>...</a:t>
             </a:r>
             <a:endParaRPr lang="en-US" noProof="0" dirty="0"/>
           </a:p>

</xml_diff>